<commit_message>
obs_max update and clean up
</commit_message>
<xml_diff>
--- a/docs/SHARP_PyGMET.pptx
+++ b/docs/SHARP_PyGMET.pptx
@@ -263,7 +263,7 @@
           <a:p>
             <a:fld id="{A3C08316-7936-694E-A576-D031D5333684}" type="datetimeFigureOut">
               <a:rPr lang="en-US" smtClean="0"/>
-              <a:t>12/29/22</a:t>
+              <a:t>1/11/23</a:t>
             </a:fld>
             <a:endParaRPr lang="en-US"/>
           </a:p>
@@ -461,7 +461,7 @@
           <a:p>
             <a:fld id="{A3C08316-7936-694E-A576-D031D5333684}" type="datetimeFigureOut">
               <a:rPr lang="en-US" smtClean="0"/>
-              <a:t>12/29/22</a:t>
+              <a:t>1/11/23</a:t>
             </a:fld>
             <a:endParaRPr lang="en-US"/>
           </a:p>
@@ -669,7 +669,7 @@
           <a:p>
             <a:fld id="{A3C08316-7936-694E-A576-D031D5333684}" type="datetimeFigureOut">
               <a:rPr lang="en-US" smtClean="0"/>
-              <a:t>12/29/22</a:t>
+              <a:t>1/11/23</a:t>
             </a:fld>
             <a:endParaRPr lang="en-US"/>
           </a:p>
@@ -867,7 +867,7 @@
           <a:p>
             <a:fld id="{A3C08316-7936-694E-A576-D031D5333684}" type="datetimeFigureOut">
               <a:rPr lang="en-US" smtClean="0"/>
-              <a:t>12/29/22</a:t>
+              <a:t>1/11/23</a:t>
             </a:fld>
             <a:endParaRPr lang="en-US"/>
           </a:p>
@@ -1142,7 +1142,7 @@
           <a:p>
             <a:fld id="{A3C08316-7936-694E-A576-D031D5333684}" type="datetimeFigureOut">
               <a:rPr lang="en-US" smtClean="0"/>
-              <a:t>12/29/22</a:t>
+              <a:t>1/11/23</a:t>
             </a:fld>
             <a:endParaRPr lang="en-US"/>
           </a:p>
@@ -1407,7 +1407,7 @@
           <a:p>
             <a:fld id="{A3C08316-7936-694E-A576-D031D5333684}" type="datetimeFigureOut">
               <a:rPr lang="en-US" smtClean="0"/>
-              <a:t>12/29/22</a:t>
+              <a:t>1/11/23</a:t>
             </a:fld>
             <a:endParaRPr lang="en-US"/>
           </a:p>
@@ -1819,7 +1819,7 @@
           <a:p>
             <a:fld id="{A3C08316-7936-694E-A576-D031D5333684}" type="datetimeFigureOut">
               <a:rPr lang="en-US" smtClean="0"/>
-              <a:t>12/29/22</a:t>
+              <a:t>1/11/23</a:t>
             </a:fld>
             <a:endParaRPr lang="en-US"/>
           </a:p>
@@ -1960,7 +1960,7 @@
           <a:p>
             <a:fld id="{A3C08316-7936-694E-A576-D031D5333684}" type="datetimeFigureOut">
               <a:rPr lang="en-US" smtClean="0"/>
-              <a:t>12/29/22</a:t>
+              <a:t>1/11/23</a:t>
             </a:fld>
             <a:endParaRPr lang="en-US"/>
           </a:p>
@@ -2073,7 +2073,7 @@
           <a:p>
             <a:fld id="{A3C08316-7936-694E-A576-D031D5333684}" type="datetimeFigureOut">
               <a:rPr lang="en-US" smtClean="0"/>
-              <a:t>12/29/22</a:t>
+              <a:t>1/11/23</a:t>
             </a:fld>
             <a:endParaRPr lang="en-US"/>
           </a:p>
@@ -2384,7 +2384,7 @@
           <a:p>
             <a:fld id="{A3C08316-7936-694E-A576-D031D5333684}" type="datetimeFigureOut">
               <a:rPr lang="en-US" smtClean="0"/>
-              <a:t>12/29/22</a:t>
+              <a:t>1/11/23</a:t>
             </a:fld>
             <a:endParaRPr lang="en-US"/>
           </a:p>
@@ -2672,7 +2672,7 @@
           <a:p>
             <a:fld id="{A3C08316-7936-694E-A576-D031D5333684}" type="datetimeFigureOut">
               <a:rPr lang="en-US" smtClean="0"/>
-              <a:t>12/29/22</a:t>
+              <a:t>1/11/23</a:t>
             </a:fld>
             <a:endParaRPr lang="en-US"/>
           </a:p>
@@ -2913,7 +2913,7 @@
           <a:p>
             <a:fld id="{A3C08316-7936-694E-A576-D031D5333684}" type="datetimeFigureOut">
               <a:rPr lang="en-US" smtClean="0"/>
-              <a:t>12/29/22</a:t>
+              <a:t>1/11/23</a:t>
             </a:fld>
             <a:endParaRPr lang="en-US"/>
           </a:p>

</xml_diff>